<commit_message>
Started to create cheatsheet.
</commit_message>
<xml_diff>
--- a/TweeFlyIcon.pptx
+++ b/TweeFlyIcon.pptx
@@ -6,6 +6,7 @@
   </p:sldMasterIdLst>
   <p:sldIdLst>
     <p:sldId id="256" r:id="rId2"/>
+    <p:sldId id="257" r:id="rId3"/>
   </p:sldIdLst>
   <p:sldSz cx="9144000" cy="6858000" type="screen4x3"/>
   <p:notesSz cx="6858000" cy="9144000"/>
@@ -104,6 +105,22 @@
       </a:defRPr>
     </a:lvl9pPr>
   </p:defaultTextStyle>
+  <p:extLst>
+    <p:ext uri="{EFAFB233-063F-42B5-8137-9DF3F51BA10A}">
+      <p15:sldGuideLst xmlns:p15="http://schemas.microsoft.com/office/powerpoint/2012/main">
+        <p15:guide id="1" orient="horz" pos="2160">
+          <p15:clr>
+            <a:srgbClr val="A4A3A4"/>
+          </p15:clr>
+        </p15:guide>
+        <p15:guide id="2" pos="2880">
+          <p15:clr>
+            <a:srgbClr val="A4A3A4"/>
+          </p15:clr>
+        </p15:guide>
+      </p15:sldGuideLst>
+    </p:ext>
+  </p:extLst>
 </p:presentation>
 </file>
 
@@ -145,10 +162,9 @@
           <a:lstStyle/>
           <a:p>
             <a:r>
-              <a:rPr lang="de-DE" smtClean="0"/>
+              <a:rPr lang="de-DE"/>
               <a:t>Titelmasterformat durch Klicken bearbeiten</a:t>
             </a:r>
-            <a:endParaRPr lang="de-DE"/>
           </a:p>
         </p:txBody>
       </p:sp>
@@ -264,10 +280,9 @@
           </a:lstStyle>
           <a:p>
             <a:r>
-              <a:rPr lang="de-DE" smtClean="0"/>
+              <a:rPr lang="de-DE"/>
               <a:t>Formatvorlage des Untertitelmasters durch Klicken bearbeiten</a:t>
             </a:r>
-            <a:endParaRPr lang="de-DE"/>
           </a:p>
         </p:txBody>
       </p:sp>
@@ -289,7 +304,7 @@
             <a:fld id="{BF916402-FF15-4250-9968-259AF17ADA53}" type="datetimeFigureOut">
               <a:rPr lang="de-DE" smtClean="0"/>
               <a:pPr/>
-              <a:t>21.12.2018</a:t>
+              <a:t>05.11.2019</a:t>
             </a:fld>
             <a:endParaRPr lang="de-DE"/>
           </a:p>
@@ -379,10 +394,9 @@
           <a:lstStyle/>
           <a:p>
             <a:r>
-              <a:rPr lang="de-DE" smtClean="0"/>
+              <a:rPr lang="de-DE"/>
               <a:t>Titelmasterformat durch Klicken bearbeiten</a:t>
             </a:r>
-            <a:endParaRPr lang="de-DE"/>
           </a:p>
         </p:txBody>
       </p:sp>
@@ -403,38 +417,37 @@
           <a:p>
             <a:pPr lvl="0"/>
             <a:r>
-              <a:rPr lang="de-DE" smtClean="0"/>
+              <a:rPr lang="de-DE"/>
               <a:t>Textmasterformate durch Klicken bearbeiten</a:t>
             </a:r>
           </a:p>
           <a:p>
             <a:pPr lvl="1"/>
             <a:r>
-              <a:rPr lang="de-DE" smtClean="0"/>
+              <a:rPr lang="de-DE"/>
               <a:t>Zweite Ebene</a:t>
             </a:r>
           </a:p>
           <a:p>
             <a:pPr lvl="2"/>
             <a:r>
-              <a:rPr lang="de-DE" smtClean="0"/>
+              <a:rPr lang="de-DE"/>
               <a:t>Dritte Ebene</a:t>
             </a:r>
           </a:p>
           <a:p>
             <a:pPr lvl="3"/>
             <a:r>
-              <a:rPr lang="de-DE" smtClean="0"/>
+              <a:rPr lang="de-DE"/>
               <a:t>Vierte Ebene</a:t>
             </a:r>
           </a:p>
           <a:p>
             <a:pPr lvl="4"/>
             <a:r>
-              <a:rPr lang="de-DE" smtClean="0"/>
+              <a:rPr lang="de-DE"/>
               <a:t>Fünfte Ebene</a:t>
             </a:r>
-            <a:endParaRPr lang="de-DE"/>
           </a:p>
         </p:txBody>
       </p:sp>
@@ -456,7 +469,7 @@
             <a:fld id="{BF916402-FF15-4250-9968-259AF17ADA53}" type="datetimeFigureOut">
               <a:rPr lang="de-DE" smtClean="0"/>
               <a:pPr/>
-              <a:t>21.12.2018</a:t>
+              <a:t>05.11.2019</a:t>
             </a:fld>
             <a:endParaRPr lang="de-DE"/>
           </a:p>
@@ -551,10 +564,9 @@
           <a:lstStyle/>
           <a:p>
             <a:r>
-              <a:rPr lang="de-DE" smtClean="0"/>
+              <a:rPr lang="de-DE"/>
               <a:t>Titelmasterformat durch Klicken bearbeiten</a:t>
             </a:r>
-            <a:endParaRPr lang="de-DE"/>
           </a:p>
         </p:txBody>
       </p:sp>
@@ -580,38 +592,37 @@
           <a:p>
             <a:pPr lvl="0"/>
             <a:r>
-              <a:rPr lang="de-DE" smtClean="0"/>
+              <a:rPr lang="de-DE"/>
               <a:t>Textmasterformate durch Klicken bearbeiten</a:t>
             </a:r>
           </a:p>
           <a:p>
             <a:pPr lvl="1"/>
             <a:r>
-              <a:rPr lang="de-DE" smtClean="0"/>
+              <a:rPr lang="de-DE"/>
               <a:t>Zweite Ebene</a:t>
             </a:r>
           </a:p>
           <a:p>
             <a:pPr lvl="2"/>
             <a:r>
-              <a:rPr lang="de-DE" smtClean="0"/>
+              <a:rPr lang="de-DE"/>
               <a:t>Dritte Ebene</a:t>
             </a:r>
           </a:p>
           <a:p>
             <a:pPr lvl="3"/>
             <a:r>
-              <a:rPr lang="de-DE" smtClean="0"/>
+              <a:rPr lang="de-DE"/>
               <a:t>Vierte Ebene</a:t>
             </a:r>
           </a:p>
           <a:p>
             <a:pPr lvl="4"/>
             <a:r>
-              <a:rPr lang="de-DE" smtClean="0"/>
+              <a:rPr lang="de-DE"/>
               <a:t>Fünfte Ebene</a:t>
             </a:r>
-            <a:endParaRPr lang="de-DE"/>
           </a:p>
         </p:txBody>
       </p:sp>
@@ -633,7 +644,7 @@
             <a:fld id="{BF916402-FF15-4250-9968-259AF17ADA53}" type="datetimeFigureOut">
               <a:rPr lang="de-DE" smtClean="0"/>
               <a:pPr/>
-              <a:t>21.12.2018</a:t>
+              <a:t>05.11.2019</a:t>
             </a:fld>
             <a:endParaRPr lang="de-DE"/>
           </a:p>
@@ -723,10 +734,9 @@
           <a:lstStyle/>
           <a:p>
             <a:r>
-              <a:rPr lang="de-DE" smtClean="0"/>
+              <a:rPr lang="de-DE"/>
               <a:t>Titelmasterformat durch Klicken bearbeiten</a:t>
             </a:r>
-            <a:endParaRPr lang="de-DE"/>
           </a:p>
         </p:txBody>
       </p:sp>
@@ -747,38 +757,37 @@
           <a:p>
             <a:pPr lvl="0"/>
             <a:r>
-              <a:rPr lang="de-DE" smtClean="0"/>
+              <a:rPr lang="de-DE"/>
               <a:t>Textmasterformate durch Klicken bearbeiten</a:t>
             </a:r>
           </a:p>
           <a:p>
             <a:pPr lvl="1"/>
             <a:r>
-              <a:rPr lang="de-DE" smtClean="0"/>
+              <a:rPr lang="de-DE"/>
               <a:t>Zweite Ebene</a:t>
             </a:r>
           </a:p>
           <a:p>
             <a:pPr lvl="2"/>
             <a:r>
-              <a:rPr lang="de-DE" smtClean="0"/>
+              <a:rPr lang="de-DE"/>
               <a:t>Dritte Ebene</a:t>
             </a:r>
           </a:p>
           <a:p>
             <a:pPr lvl="3"/>
             <a:r>
-              <a:rPr lang="de-DE" smtClean="0"/>
+              <a:rPr lang="de-DE"/>
               <a:t>Vierte Ebene</a:t>
             </a:r>
           </a:p>
           <a:p>
             <a:pPr lvl="4"/>
             <a:r>
-              <a:rPr lang="de-DE" smtClean="0"/>
+              <a:rPr lang="de-DE"/>
               <a:t>Fünfte Ebene</a:t>
             </a:r>
-            <a:endParaRPr lang="de-DE"/>
           </a:p>
         </p:txBody>
       </p:sp>
@@ -800,7 +809,7 @@
             <a:fld id="{BF916402-FF15-4250-9968-259AF17ADA53}" type="datetimeFigureOut">
               <a:rPr lang="de-DE" smtClean="0"/>
               <a:pPr/>
-              <a:t>21.12.2018</a:t>
+              <a:t>05.11.2019</a:t>
             </a:fld>
             <a:endParaRPr lang="de-DE"/>
           </a:p>
@@ -899,10 +908,9 @@
           </a:lstStyle>
           <a:p>
             <a:r>
-              <a:rPr lang="de-DE" smtClean="0"/>
+              <a:rPr lang="de-DE"/>
               <a:t>Titelmasterformat durch Klicken bearbeiten</a:t>
             </a:r>
-            <a:endParaRPr lang="de-DE"/>
           </a:p>
         </p:txBody>
       </p:sp>
@@ -1019,7 +1027,7 @@
           <a:p>
             <a:pPr lvl="0"/>
             <a:r>
-              <a:rPr lang="de-DE" smtClean="0"/>
+              <a:rPr lang="de-DE"/>
               <a:t>Textmasterformate durch Klicken bearbeiten</a:t>
             </a:r>
           </a:p>
@@ -1043,7 +1051,7 @@
             <a:fld id="{BF916402-FF15-4250-9968-259AF17ADA53}" type="datetimeFigureOut">
               <a:rPr lang="de-DE" smtClean="0"/>
               <a:pPr/>
-              <a:t>21.12.2018</a:t>
+              <a:t>05.11.2019</a:t>
             </a:fld>
             <a:endParaRPr lang="de-DE"/>
           </a:p>
@@ -1133,10 +1141,9 @@
           <a:lstStyle/>
           <a:p>
             <a:r>
-              <a:rPr lang="de-DE" smtClean="0"/>
+              <a:rPr lang="de-DE"/>
               <a:t>Titelmasterformat durch Klicken bearbeiten</a:t>
             </a:r>
-            <a:endParaRPr lang="de-DE"/>
           </a:p>
         </p:txBody>
       </p:sp>
@@ -1190,38 +1197,37 @@
           <a:p>
             <a:pPr lvl="0"/>
             <a:r>
-              <a:rPr lang="de-DE" smtClean="0"/>
+              <a:rPr lang="de-DE"/>
               <a:t>Textmasterformate durch Klicken bearbeiten</a:t>
             </a:r>
           </a:p>
           <a:p>
             <a:pPr lvl="1"/>
             <a:r>
-              <a:rPr lang="de-DE" smtClean="0"/>
+              <a:rPr lang="de-DE"/>
               <a:t>Zweite Ebene</a:t>
             </a:r>
           </a:p>
           <a:p>
             <a:pPr lvl="2"/>
             <a:r>
-              <a:rPr lang="de-DE" smtClean="0"/>
+              <a:rPr lang="de-DE"/>
               <a:t>Dritte Ebene</a:t>
             </a:r>
           </a:p>
           <a:p>
             <a:pPr lvl="3"/>
             <a:r>
-              <a:rPr lang="de-DE" smtClean="0"/>
+              <a:rPr lang="de-DE"/>
               <a:t>Vierte Ebene</a:t>
             </a:r>
           </a:p>
           <a:p>
             <a:pPr lvl="4"/>
             <a:r>
-              <a:rPr lang="de-DE" smtClean="0"/>
+              <a:rPr lang="de-DE"/>
               <a:t>Fünfte Ebene</a:t>
             </a:r>
-            <a:endParaRPr lang="de-DE"/>
           </a:p>
         </p:txBody>
       </p:sp>
@@ -1275,38 +1281,37 @@
           <a:p>
             <a:pPr lvl="0"/>
             <a:r>
-              <a:rPr lang="de-DE" smtClean="0"/>
+              <a:rPr lang="de-DE"/>
               <a:t>Textmasterformate durch Klicken bearbeiten</a:t>
             </a:r>
           </a:p>
           <a:p>
             <a:pPr lvl="1"/>
             <a:r>
-              <a:rPr lang="de-DE" smtClean="0"/>
+              <a:rPr lang="de-DE"/>
               <a:t>Zweite Ebene</a:t>
             </a:r>
           </a:p>
           <a:p>
             <a:pPr lvl="2"/>
             <a:r>
-              <a:rPr lang="de-DE" smtClean="0"/>
+              <a:rPr lang="de-DE"/>
               <a:t>Dritte Ebene</a:t>
             </a:r>
           </a:p>
           <a:p>
             <a:pPr lvl="3"/>
             <a:r>
-              <a:rPr lang="de-DE" smtClean="0"/>
+              <a:rPr lang="de-DE"/>
               <a:t>Vierte Ebene</a:t>
             </a:r>
           </a:p>
           <a:p>
             <a:pPr lvl="4"/>
             <a:r>
-              <a:rPr lang="de-DE" smtClean="0"/>
+              <a:rPr lang="de-DE"/>
               <a:t>Fünfte Ebene</a:t>
             </a:r>
-            <a:endParaRPr lang="de-DE"/>
           </a:p>
         </p:txBody>
       </p:sp>
@@ -1328,7 +1333,7 @@
             <a:fld id="{BF916402-FF15-4250-9968-259AF17ADA53}" type="datetimeFigureOut">
               <a:rPr lang="de-DE" smtClean="0"/>
               <a:pPr/>
-              <a:t>21.12.2018</a:t>
+              <a:t>05.11.2019</a:t>
             </a:fld>
             <a:endParaRPr lang="de-DE"/>
           </a:p>
@@ -1422,10 +1427,9 @@
           </a:lstStyle>
           <a:p>
             <a:r>
-              <a:rPr lang="de-DE" smtClean="0"/>
+              <a:rPr lang="de-DE"/>
               <a:t>Titelmasterformat durch Klicken bearbeiten</a:t>
             </a:r>
-            <a:endParaRPr lang="de-DE"/>
           </a:p>
         </p:txBody>
       </p:sp>
@@ -1488,7 +1492,7 @@
           <a:p>
             <a:pPr lvl="0"/>
             <a:r>
-              <a:rPr lang="de-DE" smtClean="0"/>
+              <a:rPr lang="de-DE"/>
               <a:t>Textmasterformate durch Klicken bearbeiten</a:t>
             </a:r>
           </a:p>
@@ -1544,38 +1548,37 @@
           <a:p>
             <a:pPr lvl="0"/>
             <a:r>
-              <a:rPr lang="de-DE" smtClean="0"/>
+              <a:rPr lang="de-DE"/>
               <a:t>Textmasterformate durch Klicken bearbeiten</a:t>
             </a:r>
           </a:p>
           <a:p>
             <a:pPr lvl="1"/>
             <a:r>
-              <a:rPr lang="de-DE" smtClean="0"/>
+              <a:rPr lang="de-DE"/>
               <a:t>Zweite Ebene</a:t>
             </a:r>
           </a:p>
           <a:p>
             <a:pPr lvl="2"/>
             <a:r>
-              <a:rPr lang="de-DE" smtClean="0"/>
+              <a:rPr lang="de-DE"/>
               <a:t>Dritte Ebene</a:t>
             </a:r>
           </a:p>
           <a:p>
             <a:pPr lvl="3"/>
             <a:r>
-              <a:rPr lang="de-DE" smtClean="0"/>
+              <a:rPr lang="de-DE"/>
               <a:t>Vierte Ebene</a:t>
             </a:r>
           </a:p>
           <a:p>
             <a:pPr lvl="4"/>
             <a:r>
-              <a:rPr lang="de-DE" smtClean="0"/>
+              <a:rPr lang="de-DE"/>
               <a:t>Fünfte Ebene</a:t>
             </a:r>
-            <a:endParaRPr lang="de-DE"/>
           </a:p>
         </p:txBody>
       </p:sp>
@@ -1638,7 +1641,7 @@
           <a:p>
             <a:pPr lvl="0"/>
             <a:r>
-              <a:rPr lang="de-DE" smtClean="0"/>
+              <a:rPr lang="de-DE"/>
               <a:t>Textmasterformate durch Klicken bearbeiten</a:t>
             </a:r>
           </a:p>
@@ -1694,38 +1697,37 @@
           <a:p>
             <a:pPr lvl="0"/>
             <a:r>
-              <a:rPr lang="de-DE" smtClean="0"/>
+              <a:rPr lang="de-DE"/>
               <a:t>Textmasterformate durch Klicken bearbeiten</a:t>
             </a:r>
           </a:p>
           <a:p>
             <a:pPr lvl="1"/>
             <a:r>
-              <a:rPr lang="de-DE" smtClean="0"/>
+              <a:rPr lang="de-DE"/>
               <a:t>Zweite Ebene</a:t>
             </a:r>
           </a:p>
           <a:p>
             <a:pPr lvl="2"/>
             <a:r>
-              <a:rPr lang="de-DE" smtClean="0"/>
+              <a:rPr lang="de-DE"/>
               <a:t>Dritte Ebene</a:t>
             </a:r>
           </a:p>
           <a:p>
             <a:pPr lvl="3"/>
             <a:r>
-              <a:rPr lang="de-DE" smtClean="0"/>
+              <a:rPr lang="de-DE"/>
               <a:t>Vierte Ebene</a:t>
             </a:r>
           </a:p>
           <a:p>
             <a:pPr lvl="4"/>
             <a:r>
-              <a:rPr lang="de-DE" smtClean="0"/>
+              <a:rPr lang="de-DE"/>
               <a:t>Fünfte Ebene</a:t>
             </a:r>
-            <a:endParaRPr lang="de-DE"/>
           </a:p>
         </p:txBody>
       </p:sp>
@@ -1747,7 +1749,7 @@
             <a:fld id="{BF916402-FF15-4250-9968-259AF17ADA53}" type="datetimeFigureOut">
               <a:rPr lang="de-DE" smtClean="0"/>
               <a:pPr/>
-              <a:t>21.12.2018</a:t>
+              <a:t>05.11.2019</a:t>
             </a:fld>
             <a:endParaRPr lang="de-DE"/>
           </a:p>
@@ -1837,10 +1839,9 @@
           <a:lstStyle/>
           <a:p>
             <a:r>
-              <a:rPr lang="de-DE" smtClean="0"/>
+              <a:rPr lang="de-DE"/>
               <a:t>Titelmasterformat durch Klicken bearbeiten</a:t>
             </a:r>
-            <a:endParaRPr lang="de-DE"/>
           </a:p>
         </p:txBody>
       </p:sp>
@@ -1862,7 +1863,7 @@
             <a:fld id="{BF916402-FF15-4250-9968-259AF17ADA53}" type="datetimeFigureOut">
               <a:rPr lang="de-DE" smtClean="0"/>
               <a:pPr/>
-              <a:t>21.12.2018</a:t>
+              <a:t>05.11.2019</a:t>
             </a:fld>
             <a:endParaRPr lang="de-DE"/>
           </a:p>
@@ -1954,7 +1955,7 @@
             <a:fld id="{BF916402-FF15-4250-9968-259AF17ADA53}" type="datetimeFigureOut">
               <a:rPr lang="de-DE" smtClean="0"/>
               <a:pPr/>
-              <a:t>21.12.2018</a:t>
+              <a:t>05.11.2019</a:t>
             </a:fld>
             <a:endParaRPr lang="de-DE"/>
           </a:p>
@@ -2053,10 +2054,9 @@
           </a:lstStyle>
           <a:p>
             <a:r>
-              <a:rPr lang="de-DE" smtClean="0"/>
+              <a:rPr lang="de-DE"/>
               <a:t>Titelmasterformat durch Klicken bearbeiten</a:t>
             </a:r>
-            <a:endParaRPr lang="de-DE"/>
           </a:p>
         </p:txBody>
       </p:sp>
@@ -2110,38 +2110,37 @@
           <a:p>
             <a:pPr lvl="0"/>
             <a:r>
-              <a:rPr lang="de-DE" smtClean="0"/>
+              <a:rPr lang="de-DE"/>
               <a:t>Textmasterformate durch Klicken bearbeiten</a:t>
             </a:r>
           </a:p>
           <a:p>
             <a:pPr lvl="1"/>
             <a:r>
-              <a:rPr lang="de-DE" smtClean="0"/>
+              <a:rPr lang="de-DE"/>
               <a:t>Zweite Ebene</a:t>
             </a:r>
           </a:p>
           <a:p>
             <a:pPr lvl="2"/>
             <a:r>
-              <a:rPr lang="de-DE" smtClean="0"/>
+              <a:rPr lang="de-DE"/>
               <a:t>Dritte Ebene</a:t>
             </a:r>
           </a:p>
           <a:p>
             <a:pPr lvl="3"/>
             <a:r>
-              <a:rPr lang="de-DE" smtClean="0"/>
+              <a:rPr lang="de-DE"/>
               <a:t>Vierte Ebene</a:t>
             </a:r>
           </a:p>
           <a:p>
             <a:pPr lvl="4"/>
             <a:r>
-              <a:rPr lang="de-DE" smtClean="0"/>
+              <a:rPr lang="de-DE"/>
               <a:t>Fünfte Ebene</a:t>
             </a:r>
-            <a:endParaRPr lang="de-DE"/>
           </a:p>
         </p:txBody>
       </p:sp>
@@ -2204,7 +2203,7 @@
           <a:p>
             <a:pPr lvl="0"/>
             <a:r>
-              <a:rPr lang="de-DE" smtClean="0"/>
+              <a:rPr lang="de-DE"/>
               <a:t>Textmasterformate durch Klicken bearbeiten</a:t>
             </a:r>
           </a:p>
@@ -2228,7 +2227,7 @@
             <a:fld id="{BF916402-FF15-4250-9968-259AF17ADA53}" type="datetimeFigureOut">
               <a:rPr lang="de-DE" smtClean="0"/>
               <a:pPr/>
-              <a:t>21.12.2018</a:t>
+              <a:t>05.11.2019</a:t>
             </a:fld>
             <a:endParaRPr lang="de-DE"/>
           </a:p>
@@ -2327,10 +2326,9 @@
           </a:lstStyle>
           <a:p>
             <a:r>
-              <a:rPr lang="de-DE" smtClean="0"/>
+              <a:rPr lang="de-DE"/>
               <a:t>Titelmasterformat durch Klicken bearbeiten</a:t>
             </a:r>
-            <a:endParaRPr lang="de-DE"/>
           </a:p>
         </p:txBody>
       </p:sp>
@@ -2454,7 +2452,7 @@
           <a:p>
             <a:pPr lvl="0"/>
             <a:r>
-              <a:rPr lang="de-DE" smtClean="0"/>
+              <a:rPr lang="de-DE"/>
               <a:t>Textmasterformate durch Klicken bearbeiten</a:t>
             </a:r>
           </a:p>
@@ -2478,7 +2476,7 @@
             <a:fld id="{BF916402-FF15-4250-9968-259AF17ADA53}" type="datetimeFigureOut">
               <a:rPr lang="de-DE" smtClean="0"/>
               <a:pPr/>
-              <a:t>21.12.2018</a:t>
+              <a:t>05.11.2019</a:t>
             </a:fld>
             <a:endParaRPr lang="de-DE"/>
           </a:p>
@@ -2583,10 +2581,9 @@
           <a:lstStyle/>
           <a:p>
             <a:r>
-              <a:rPr lang="de-DE" smtClean="0"/>
+              <a:rPr lang="de-DE"/>
               <a:t>Titelmasterformat durch Klicken bearbeiten</a:t>
             </a:r>
-            <a:endParaRPr lang="de-DE"/>
           </a:p>
         </p:txBody>
       </p:sp>
@@ -2617,38 +2614,37 @@
           <a:p>
             <a:pPr lvl="0"/>
             <a:r>
-              <a:rPr lang="de-DE" smtClean="0"/>
+              <a:rPr lang="de-DE"/>
               <a:t>Textmasterformate durch Klicken bearbeiten</a:t>
             </a:r>
           </a:p>
           <a:p>
             <a:pPr lvl="1"/>
             <a:r>
-              <a:rPr lang="de-DE" smtClean="0"/>
+              <a:rPr lang="de-DE"/>
               <a:t>Zweite Ebene</a:t>
             </a:r>
           </a:p>
           <a:p>
             <a:pPr lvl="2"/>
             <a:r>
-              <a:rPr lang="de-DE" smtClean="0"/>
+              <a:rPr lang="de-DE"/>
               <a:t>Dritte Ebene</a:t>
             </a:r>
           </a:p>
           <a:p>
             <a:pPr lvl="3"/>
             <a:r>
-              <a:rPr lang="de-DE" smtClean="0"/>
+              <a:rPr lang="de-DE"/>
               <a:t>Vierte Ebene</a:t>
             </a:r>
           </a:p>
           <a:p>
             <a:pPr lvl="4"/>
             <a:r>
-              <a:rPr lang="de-DE" smtClean="0"/>
+              <a:rPr lang="de-DE"/>
               <a:t>Fünfte Ebene</a:t>
             </a:r>
-            <a:endParaRPr lang="de-DE"/>
           </a:p>
         </p:txBody>
       </p:sp>
@@ -2688,7 +2684,7 @@
             <a:fld id="{BF916402-FF15-4250-9968-259AF17ADA53}" type="datetimeFigureOut">
               <a:rPr lang="de-DE" smtClean="0"/>
               <a:pPr/>
-              <a:t>21.12.2018</a:t>
+              <a:t>05.11.2019</a:t>
             </a:fld>
             <a:endParaRPr lang="de-DE"/>
           </a:p>
@@ -3334,7 +3330,7 @@
           <a:lstStyle/>
           <a:p>
             <a:r>
-              <a:rPr lang="de-DE" sz="13800" dirty="0" err="1" smtClean="0">
+              <a:rPr lang="de-DE" sz="13800" dirty="0" err="1">
                 <a:latin typeface="comic andy" pitchFamily="2" charset="0"/>
               </a:rPr>
               <a:t>TweeFly</a:t>
@@ -3368,14 +3364,11 @@
           <a:lstStyle/>
           <a:p>
             <a:r>
-              <a:rPr lang="de-DE" sz="9600" dirty="0" smtClean="0">
+              <a:rPr lang="de-DE" sz="9600" dirty="0">
                 <a:latin typeface="comic andy" pitchFamily="2" charset="0"/>
               </a:rPr>
               <a:t>pro</a:t>
             </a:r>
-            <a:endParaRPr lang="de-DE" sz="9600" dirty="0">
-              <a:latin typeface="comic andy" pitchFamily="2" charset="0"/>
-            </a:endParaRPr>
           </a:p>
         </p:txBody>
       </p:sp>
@@ -3654,7 +3647,7 @@
           <a:lstStyle/>
           <a:p>
             <a:r>
-              <a:rPr lang="de-DE" sz="13800" dirty="0" err="1" smtClean="0">
+              <a:rPr lang="de-DE" sz="13800" dirty="0" err="1">
                 <a:latin typeface="comic andy" pitchFamily="2" charset="0"/>
               </a:rPr>
               <a:t>TweeFly</a:t>
@@ -3688,7 +3681,7 @@
           <a:lstStyle/>
           <a:p>
             <a:r>
-              <a:rPr lang="de-DE" sz="9600" dirty="0" err="1" smtClean="0">
+              <a:rPr lang="de-DE" sz="9600" dirty="0" err="1">
                 <a:latin typeface="comic andy" pitchFamily="2" charset="0"/>
               </a:rPr>
               <a:t>free</a:t>
@@ -3700,6 +3693,146 @@
         </p:txBody>
       </p:sp>
     </p:spTree>
+  </p:cSld>
+  <p:clrMapOvr>
+    <a:masterClrMapping/>
+  </p:clrMapOvr>
+</p:sld>
+</file>
+
+<file path=ppt/slides/slide2.xml><?xml version="1.0" encoding="utf-8"?>
+<p:sld xmlns:a="http://schemas.openxmlformats.org/drawingml/2006/main" xmlns:r="http://schemas.openxmlformats.org/officeDocument/2006/relationships" xmlns:p="http://schemas.openxmlformats.org/presentationml/2006/main">
+  <p:cSld>
+    <p:spTree>
+      <p:nvGrpSpPr>
+        <p:cNvPr id="1" name=""/>
+        <p:cNvGrpSpPr/>
+        <p:nvPr/>
+      </p:nvGrpSpPr>
+      <p:grpSpPr>
+        <a:xfrm>
+          <a:off x="0" y="0"/>
+          <a:ext cx="0" cy="0"/>
+          <a:chOff x="0" y="0"/>
+          <a:chExt cx="0" cy="0"/>
+        </a:xfrm>
+      </p:grpSpPr>
+      <p:sp>
+        <p:nvSpPr>
+          <p:cNvPr id="2" name="Titel 1">
+            <a:extLst>
+              <a:ext uri="{FF2B5EF4-FFF2-40B4-BE49-F238E27FC236}">
+                <a16:creationId xmlns:a16="http://schemas.microsoft.com/office/drawing/2014/main" id="{503FDB6E-2CE0-4119-81CE-882ACABAADEB}"/>
+              </a:ext>
+            </a:extLst>
+          </p:cNvPr>
+          <p:cNvSpPr>
+            <a:spLocks noGrp="1"/>
+          </p:cNvSpPr>
+          <p:nvPr>
+            <p:ph type="title"/>
+          </p:nvPr>
+        </p:nvSpPr>
+        <p:spPr/>
+        <p:txBody>
+          <a:bodyPr/>
+          <a:lstStyle/>
+          <a:p>
+            <a:endParaRPr lang="de-DE"/>
+          </a:p>
+        </p:txBody>
+      </p:sp>
+      <p:sp>
+        <p:nvSpPr>
+          <p:cNvPr id="4" name="Rechteck: gefaltete Ecke 3">
+            <a:extLst>
+              <a:ext uri="{FF2B5EF4-FFF2-40B4-BE49-F238E27FC236}">
+                <a16:creationId xmlns:a16="http://schemas.microsoft.com/office/drawing/2014/main" id="{27B16DAE-3BB7-48D1-80AD-AB92A6613D73}"/>
+              </a:ext>
+            </a:extLst>
+          </p:cNvPr>
+          <p:cNvSpPr/>
+          <p:nvPr/>
+        </p:nvSpPr>
+        <p:spPr>
+          <a:xfrm>
+            <a:off x="611560" y="2420888"/>
+            <a:ext cx="936104" cy="1080120"/>
+          </a:xfrm>
+          <a:prstGeom prst="foldedCorner">
+            <a:avLst/>
+          </a:prstGeom>
+        </p:spPr>
+        <p:style>
+          <a:lnRef idx="2">
+            <a:schemeClr val="accent2">
+              <a:shade val="50000"/>
+            </a:schemeClr>
+          </a:lnRef>
+          <a:fillRef idx="1">
+            <a:schemeClr val="accent2"/>
+          </a:fillRef>
+          <a:effectRef idx="0">
+            <a:schemeClr val="accent2"/>
+          </a:effectRef>
+          <a:fontRef idx="minor">
+            <a:schemeClr val="lt1"/>
+          </a:fontRef>
+        </p:style>
+        <p:txBody>
+          <a:bodyPr rtlCol="0" anchor="ctr"/>
+          <a:lstStyle/>
+          <a:p>
+            <a:pPr algn="ctr"/>
+            <a:endParaRPr lang="de-DE" sz="2400" dirty="0"/>
+          </a:p>
+        </p:txBody>
+      </p:sp>
+      <p:sp>
+        <p:nvSpPr>
+          <p:cNvPr id="5" name="Rechteck 4">
+            <a:extLst>
+              <a:ext uri="{FF2B5EF4-FFF2-40B4-BE49-F238E27FC236}">
+                <a16:creationId xmlns:a16="http://schemas.microsoft.com/office/drawing/2014/main" id="{7AE4978E-1817-46FD-A663-86A0CD50E199}"/>
+              </a:ext>
+            </a:extLst>
+          </p:cNvPr>
+          <p:cNvSpPr/>
+          <p:nvPr/>
+        </p:nvSpPr>
+        <p:spPr>
+          <a:xfrm>
+            <a:off x="457200" y="2474893"/>
+            <a:ext cx="1234480" cy="954107"/>
+          </a:xfrm>
+          <a:prstGeom prst="rect">
+            <a:avLst/>
+          </a:prstGeom>
+        </p:spPr>
+        <p:txBody>
+          <a:bodyPr wrap="square">
+            <a:spAutoFit/>
+          </a:bodyPr>
+          <a:lstStyle/>
+          <a:p>
+            <a:pPr algn="ctr"/>
+            <a:r>
+              <a:rPr lang="de-DE" sz="2800" b="1" dirty="0">
+                <a:solidFill>
+                  <a:schemeClr val="bg1"/>
+                </a:solidFill>
+              </a:rPr>
+              <a:t>Cheat Sheet</a:t>
+            </a:r>
+          </a:p>
+        </p:txBody>
+      </p:sp>
+    </p:spTree>
+    <p:extLst>
+      <p:ext uri="{BB962C8B-B14F-4D97-AF65-F5344CB8AC3E}">
+        <p14:creationId xmlns:p14="http://schemas.microsoft.com/office/powerpoint/2010/main" val="1956723924"/>
+      </p:ext>
+    </p:extLst>
   </p:cSld>
   <p:clrMapOvr>
     <a:masterClrMapping/>

</xml_diff>